<commit_message>
immersive room tempalte and vide tox
</commit_message>
<xml_diff>
--- a/basic_workshop_TD/Workshop_presentation.pptx
+++ b/basic_workshop_TD/Workshop_presentation.pptx
@@ -113,6 +113,11 @@
       </a:defRPr>
     </a:lvl9pPr>
   </p:defaultTextStyle>
+  <p:extLst>
+    <p:ext uri="{EFAFB233-063F-42B5-8137-9DF3F51BA10A}">
+      <p15:sldGuideLst xmlns:p15="http://schemas.microsoft.com/office/powerpoint/2012/main"/>
+    </p:ext>
+  </p:extLst>
 </p:presentation>
 </file>
 
@@ -4731,7 +4736,7 @@
             <a:fld id="{B61BEF0D-F0BB-DE4B-95CE-6DB70DBA9567}" type="datetimeFigureOut">
               <a:rPr lang="en-US" smtClean="0"/>
               <a:pPr/>
-              <a:t>10/15/23</a:t>
+              <a:t>10/16/23</a:t>
             </a:fld>
             <a:endParaRPr lang="en-US" dirty="0"/>
           </a:p>
@@ -5715,7 +5720,7 @@
             <a:fld id="{B61BEF0D-F0BB-DE4B-95CE-6DB70DBA9567}" type="datetimeFigureOut">
               <a:rPr lang="en-US" smtClean="0"/>
               <a:pPr/>
-              <a:t>10/15/23</a:t>
+              <a:t>10/16/23</a:t>
             </a:fld>
             <a:endParaRPr lang="en-US" dirty="0"/>
           </a:p>
@@ -6587,7 +6592,7 @@
             <a:fld id="{B61BEF0D-F0BB-DE4B-95CE-6DB70DBA9567}" type="datetimeFigureOut">
               <a:rPr lang="en-US" smtClean="0"/>
               <a:pPr/>
-              <a:t>10/15/23</a:t>
+              <a:t>10/16/23</a:t>
             </a:fld>
             <a:endParaRPr lang="en-US" dirty="0"/>
           </a:p>
@@ -7610,7 +7615,7 @@
             <a:fld id="{B61BEF0D-F0BB-DE4B-95CE-6DB70DBA9567}" type="datetimeFigureOut">
               <a:rPr lang="en-US" smtClean="0"/>
               <a:pPr/>
-              <a:t>10/15/23</a:t>
+              <a:t>10/16/23</a:t>
             </a:fld>
             <a:endParaRPr lang="en-US" dirty="0"/>
           </a:p>
@@ -8532,7 +8537,7 @@
             <a:fld id="{B61BEF0D-F0BB-DE4B-95CE-6DB70DBA9567}" type="datetimeFigureOut">
               <a:rPr lang="en-US" smtClean="0"/>
               <a:pPr/>
-              <a:t>10/15/23</a:t>
+              <a:t>10/16/23</a:t>
             </a:fld>
             <a:endParaRPr lang="en-US" dirty="0"/>
           </a:p>
@@ -9190,7 +9195,7 @@
             <a:fld id="{B61BEF0D-F0BB-DE4B-95CE-6DB70DBA9567}" type="datetimeFigureOut">
               <a:rPr lang="en-US" smtClean="0"/>
               <a:pPr/>
-              <a:t>10/15/23</a:t>
+              <a:t>10/16/23</a:t>
             </a:fld>
             <a:endParaRPr lang="en-US" dirty="0"/>
           </a:p>
@@ -10049,7 +10054,7 @@
             <a:fld id="{B61BEF0D-F0BB-DE4B-95CE-6DB70DBA9567}" type="datetimeFigureOut">
               <a:rPr lang="en-US" smtClean="0"/>
               <a:pPr/>
-              <a:t>10/15/23</a:t>
+              <a:t>10/16/23</a:t>
             </a:fld>
             <a:endParaRPr lang="en-US" dirty="0"/>
           </a:p>
@@ -10234,7 +10239,7 @@
             <a:fld id="{B61BEF0D-F0BB-DE4B-95CE-6DB70DBA9567}" type="datetimeFigureOut">
               <a:rPr lang="en-US" smtClean="0"/>
               <a:pPr/>
-              <a:t>10/15/23</a:t>
+              <a:t>10/16/23</a:t>
             </a:fld>
             <a:endParaRPr lang="en-US" dirty="0"/>
           </a:p>
@@ -11093,7 +11098,7 @@
             <a:fld id="{B61BEF0D-F0BB-DE4B-95CE-6DB70DBA9567}" type="datetimeFigureOut">
               <a:rPr lang="en-US" smtClean="0"/>
               <a:pPr/>
-              <a:t>10/15/23</a:t>
+              <a:t>10/16/23</a:t>
             </a:fld>
             <a:endParaRPr lang="en-US" dirty="0"/>
           </a:p>
@@ -11314,7 +11319,7 @@
             <a:fld id="{B61BEF0D-F0BB-DE4B-95CE-6DB70DBA9567}" type="datetimeFigureOut">
               <a:rPr lang="en-US" smtClean="0"/>
               <a:pPr/>
-              <a:t>10/15/23</a:t>
+              <a:t>10/16/23</a:t>
             </a:fld>
             <a:endParaRPr lang="en-US" dirty="0"/>
           </a:p>
@@ -12241,7 +12246,7 @@
             <a:fld id="{B61BEF0D-F0BB-DE4B-95CE-6DB70DBA9567}" type="datetimeFigureOut">
               <a:rPr lang="en-US" smtClean="0"/>
               <a:pPr/>
-              <a:t>10/15/23</a:t>
+              <a:t>10/16/23</a:t>
             </a:fld>
             <a:endParaRPr lang="en-US" dirty="0"/>
           </a:p>
@@ -12527,7 +12532,7 @@
             <a:fld id="{B61BEF0D-F0BB-DE4B-95CE-6DB70DBA9567}" type="datetimeFigureOut">
               <a:rPr lang="en-US" smtClean="0"/>
               <a:pPr/>
-              <a:t>10/15/23</a:t>
+              <a:t>10/16/23</a:t>
             </a:fld>
             <a:endParaRPr lang="en-US" dirty="0"/>
           </a:p>
@@ -12919,7 +12924,7 @@
             <a:fld id="{B61BEF0D-F0BB-DE4B-95CE-6DB70DBA9567}" type="datetimeFigureOut">
               <a:rPr lang="en-US" smtClean="0"/>
               <a:pPr/>
-              <a:t>10/15/23</a:t>
+              <a:t>10/16/23</a:t>
             </a:fld>
             <a:endParaRPr lang="en-US" dirty="0"/>
           </a:p>
@@ -13047,7 +13052,7 @@
             <a:fld id="{B61BEF0D-F0BB-DE4B-95CE-6DB70DBA9567}" type="datetimeFigureOut">
               <a:rPr lang="en-US" smtClean="0"/>
               <a:pPr/>
-              <a:t>10/15/23</a:t>
+              <a:t>10/16/23</a:t>
             </a:fld>
             <a:endParaRPr lang="en-US" dirty="0"/>
           </a:p>
@@ -13144,7 +13149,7 @@
             <a:fld id="{B61BEF0D-F0BB-DE4B-95CE-6DB70DBA9567}" type="datetimeFigureOut">
               <a:rPr lang="en-US" smtClean="0"/>
               <a:pPr/>
-              <a:t>10/15/23</a:t>
+              <a:t>10/16/23</a:t>
             </a:fld>
             <a:endParaRPr lang="en-US" dirty="0"/>
           </a:p>
@@ -14117,7 +14122,7 @@
             <a:fld id="{B61BEF0D-F0BB-DE4B-95CE-6DB70DBA9567}" type="datetimeFigureOut">
               <a:rPr lang="en-US" smtClean="0"/>
               <a:pPr/>
-              <a:t>10/15/23</a:t>
+              <a:t>10/16/23</a:t>
             </a:fld>
             <a:endParaRPr lang="en-US" dirty="0"/>
           </a:p>
@@ -15114,7 +15119,7 @@
             <a:fld id="{B61BEF0D-F0BB-DE4B-95CE-6DB70DBA9567}" type="datetimeFigureOut">
               <a:rPr lang="en-US" smtClean="0"/>
               <a:pPr/>
-              <a:t>10/15/23</a:t>
+              <a:t>10/16/23</a:t>
             </a:fld>
             <a:endParaRPr lang="en-US" dirty="0"/>
           </a:p>
@@ -16000,7 +16005,7 @@
             <a:fld id="{B61BEF0D-F0BB-DE4B-95CE-6DB70DBA9567}" type="datetimeFigureOut">
               <a:rPr lang="en-US" smtClean="0"/>
               <a:pPr/>
-              <a:t>10/15/23</a:t>
+              <a:t>10/16/23</a:t>
             </a:fld>
             <a:endParaRPr lang="en-US" dirty="0"/>
           </a:p>
@@ -18077,6 +18082,13 @@
             <a:r>
               <a:rPr lang="en-GB" dirty="0"/>
               <a:t>Not good to make sound – go to Ableton or Max</a:t>
+            </a:r>
+          </a:p>
+          <a:p>
+            <a:pPr lvl="1"/>
+            <a:r>
+              <a:rPr lang="en-GB" dirty="0"/>
+              <a:t>Good to orchestrate midis though</a:t>
             </a:r>
           </a:p>
         </p:txBody>
@@ -19283,7 +19295,7 @@
               <a:buNone/>
             </a:pPr>
             <a:r>
-              <a:rPr lang="en-US" cap="all">
+              <a:rPr lang="en-US" cap="all" dirty="0">
                 <a:solidFill>
                   <a:schemeClr val="tx2">
                     <a:lumMod val="40000"/>
@@ -19291,7 +19303,51 @@
                   </a:schemeClr>
                 </a:solidFill>
               </a:rPr>
-              <a:t>https://www.youtube.com/watch?v=AMGkNHyQ4o0&amp;list=PL3zGSOEHGdiR5x5BIg8E8yn2BQMbQ6igb</a:t>
+              <a:t>https://</a:t>
+            </a:r>
+            <a:r>
+              <a:rPr lang="en-US" cap="all" dirty="0" err="1">
+                <a:solidFill>
+                  <a:schemeClr val="tx2">
+                    <a:lumMod val="40000"/>
+                    <a:lumOff val="60000"/>
+                  </a:schemeClr>
+                </a:solidFill>
+              </a:rPr>
+              <a:t>www.youtube.com</a:t>
+            </a:r>
+            <a:r>
+              <a:rPr lang="en-US" cap="all" dirty="0">
+                <a:solidFill>
+                  <a:schemeClr val="tx2">
+                    <a:lumMod val="40000"/>
+                    <a:lumOff val="60000"/>
+                  </a:schemeClr>
+                </a:solidFill>
+              </a:rPr>
+              <a:t>/</a:t>
+            </a:r>
+            <a:r>
+              <a:rPr lang="en-US" cap="all" dirty="0" err="1">
+                <a:solidFill>
+                  <a:schemeClr val="tx2">
+                    <a:lumMod val="40000"/>
+                    <a:lumOff val="60000"/>
+                  </a:schemeClr>
+                </a:solidFill>
+              </a:rPr>
+              <a:t>watch?v</a:t>
+            </a:r>
+            <a:r>
+              <a:rPr lang="en-US" cap="all" dirty="0">
+                <a:solidFill>
+                  <a:schemeClr val="tx2">
+                    <a:lumMod val="40000"/>
+                    <a:lumOff val="60000"/>
+                  </a:schemeClr>
+                </a:solidFill>
+              </a:rPr>
+              <a:t>=AMGkNHyQ4o0&amp;list=PL3zGSOEHGdiR5x5BIg8E8yn2BQMbQ6igb</a:t>
             </a:r>
           </a:p>
         </p:txBody>

</xml_diff>